<commit_message>
Added diagram and some text and formatted some more
</commit_message>
<xml_diff>
--- a/redex/poster/Parallel Programming Poster 3 Column.pptx
+++ b/redex/poster/Parallel Programming Poster 3 Column.pptx
@@ -207,7 +207,7 @@
             <a:fld id="{0158C5BC-9A70-462C-B28D-9600239EAC64}" type="datetimeFigureOut">
               <a:rPr lang="en-US" smtClean="0"/>
               <a:pPr/>
-              <a:t>4/17/2013</a:t>
+              <a:t>4/18/2013</a:t>
             </a:fld>
             <a:endParaRPr lang="en-US"/>
           </a:p>
@@ -374,7 +374,7 @@
             <a:fld id="{E6CC2317-6751-4CD4-9995-8782DD78E936}" type="datetimeFigureOut">
               <a:rPr lang="en-US" smtClean="0"/>
               <a:pPr/>
-              <a:t>4/17/2013</a:t>
+              <a:t>4/18/2013</a:t>
             </a:fld>
             <a:endParaRPr lang="en-US" dirty="0"/>
           </a:p>
@@ -17426,86 +17426,117 @@
             <p:ph type="body" sz="quarter" idx="10"/>
           </p:nvPr>
         </p:nvSpPr>
-        <p:spPr/>
+        <p:spPr>
+          <a:xfrm>
+            <a:off x="904186" y="6295353"/>
+            <a:ext cx="13591277" cy="6370953"/>
+          </a:xfrm>
+        </p:spPr>
         <p:txBody>
           <a:bodyPr/>
           <a:lstStyle/>
           <a:p>
             <a:r>
-              <a:rPr lang="en-US" dirty="0" smtClean="0"/>
-              <a:t>Parallel programming  with state is hard. blah blah </a:t>
-            </a:r>
-            <a:r>
-              <a:rPr lang="en-US" dirty="0" err="1" smtClean="0"/>
+              <a:rPr lang="en-US" sz="3200" dirty="0" smtClean="0"/>
+              <a:t>Parallel programming is </a:t>
+            </a:r>
+            <a:r>
+              <a:rPr lang="en-US" sz="3200" dirty="0"/>
+              <a:t>a form of computation in which many calculations are carried out simultaneously</a:t>
+            </a:r>
+            <a:r>
+              <a:rPr lang="en-US" sz="3200" dirty="0" smtClean="0"/>
+              <a:t>, </a:t>
+            </a:r>
+            <a:r>
+              <a:rPr lang="en-US" sz="3200" dirty="0"/>
+              <a:t>operating on the principle that large problems can often be divided into smaller ones, which are then solved </a:t>
+            </a:r>
+            <a:r>
+              <a:rPr lang="en-US" sz="3200" dirty="0" smtClean="0"/>
+              <a:t>concurrently.</a:t>
+            </a:r>
+          </a:p>
+          <a:p>
+            <a:r>
+              <a:rPr lang="en-US" sz="3200" dirty="0" smtClean="0"/>
+              <a:t>Parallel </a:t>
+            </a:r>
+            <a:r>
+              <a:rPr lang="en-US" sz="3200" dirty="0" smtClean="0"/>
+              <a:t>programming  with state is hard. blah blah </a:t>
+            </a:r>
+            <a:r>
+              <a:rPr lang="en-US" sz="3200" dirty="0" err="1" smtClean="0"/>
               <a:t>blah</a:t>
             </a:r>
             <a:r>
-              <a:rPr lang="en-US" dirty="0" smtClean="0"/>
+              <a:rPr lang="en-US" sz="3200" dirty="0" smtClean="0"/>
               <a:t> </a:t>
             </a:r>
             <a:r>
-              <a:rPr lang="en-US" dirty="0" err="1" smtClean="0"/>
+              <a:rPr lang="en-US" sz="3200" dirty="0" err="1" smtClean="0"/>
               <a:t>blah</a:t>
             </a:r>
             <a:r>
-              <a:rPr lang="en-US" dirty="0" smtClean="0"/>
+              <a:rPr lang="en-US" sz="3200" dirty="0" smtClean="0"/>
               <a:t> </a:t>
             </a:r>
             <a:r>
-              <a:rPr lang="en-US" dirty="0" err="1" smtClean="0"/>
+              <a:rPr lang="en-US" sz="3200" dirty="0" err="1" smtClean="0"/>
               <a:t>blah</a:t>
             </a:r>
             <a:r>
-              <a:rPr lang="en-US" dirty="0" smtClean="0"/>
+              <a:rPr lang="en-US" sz="3200" dirty="0" smtClean="0"/>
               <a:t> </a:t>
             </a:r>
             <a:r>
-              <a:rPr lang="en-US" dirty="0" err="1" smtClean="0"/>
+              <a:rPr lang="en-US" sz="3200" dirty="0" err="1" smtClean="0"/>
               <a:t>blah</a:t>
             </a:r>
-            <a:endParaRPr lang="en-US" dirty="0" smtClean="0"/>
-          </a:p>
-          <a:p>
-            <a:endParaRPr lang="en-US" dirty="0"/>
-          </a:p>
-          <a:p>
-            <a:r>
-              <a:rPr lang="en-US" dirty="0" smtClean="0"/>
+            <a:endParaRPr lang="en-US" sz="3200" dirty="0" smtClean="0"/>
+          </a:p>
+          <a:p>
+            <a:endParaRPr lang="en-US" sz="3200" dirty="0"/>
+          </a:p>
+          <a:p>
+            <a:r>
+              <a:rPr lang="en-US" sz="3200" dirty="0" smtClean="0"/>
               <a:t>Non Determinism blah </a:t>
             </a:r>
             <a:r>
-              <a:rPr lang="en-US" dirty="0" err="1" smtClean="0"/>
+              <a:rPr lang="en-US" sz="3200" dirty="0" err="1" smtClean="0"/>
               <a:t>blah</a:t>
             </a:r>
             <a:r>
-              <a:rPr lang="en-US" dirty="0" smtClean="0"/>
+              <a:rPr lang="en-US" sz="3200" dirty="0" smtClean="0"/>
               <a:t> </a:t>
             </a:r>
             <a:r>
-              <a:rPr lang="en-US" dirty="0" err="1" smtClean="0"/>
+              <a:rPr lang="en-US" sz="3200" dirty="0" err="1" smtClean="0"/>
               <a:t>blah</a:t>
             </a:r>
             <a:r>
-              <a:rPr lang="en-US" dirty="0" smtClean="0"/>
+              <a:rPr lang="en-US" sz="3200" dirty="0" smtClean="0"/>
               <a:t> generic definition</a:t>
             </a:r>
           </a:p>
           <a:p>
-            <a:endParaRPr lang="en-US" dirty="0" smtClean="0"/>
-          </a:p>
-          <a:p>
-            <a:r>
-              <a:rPr lang="en-US" dirty="0" smtClean="0"/>
+            <a:endParaRPr lang="en-US" sz="3200" dirty="0" smtClean="0"/>
+          </a:p>
+          <a:p>
+            <a:r>
+              <a:rPr lang="en-US" sz="3200" dirty="0" smtClean="0"/>
               <a:t>It is the interaction of being parallel and keeping state that is </a:t>
             </a:r>
             <a:r>
-              <a:rPr lang="en-US" dirty="0" err="1" smtClean="0"/>
+              <a:rPr lang="en-US" sz="3200" dirty="0" err="1" smtClean="0"/>
               <a:t>dfficult</a:t>
             </a:r>
-            <a:endParaRPr lang="en-US" dirty="0" smtClean="0"/>
-          </a:p>
-          <a:p>
-            <a:endParaRPr lang="en-US" dirty="0"/>
+            <a:endParaRPr lang="en-US" sz="3200" dirty="0" smtClean="0"/>
+          </a:p>
+          <a:p>
+            <a:endParaRPr lang="en-US" sz="2800" dirty="0"/>
           </a:p>
           <a:p>
             <a:endParaRPr lang="en-US" dirty="0"/>
@@ -17555,30 +17586,6 @@
       </p:sp>
       <p:sp>
         <p:nvSpPr>
-          <p:cNvPr id="552" name="Picture Placeholder 551"/>
-          <p:cNvSpPr>
-            <a:spLocks noGrp="1"/>
-          </p:cNvSpPr>
-          <p:nvPr>
-            <p:ph type="pic" sz="quarter" idx="15"/>
-          </p:nvPr>
-        </p:nvSpPr>
-        <p:spPr/>
-      </p:sp>
-      <p:sp>
-        <p:nvSpPr>
-          <p:cNvPr id="553" name="Picture Placeholder 552"/>
-          <p:cNvSpPr>
-            <a:spLocks noGrp="1"/>
-          </p:cNvSpPr>
-          <p:nvPr>
-            <p:ph type="pic" sz="quarter" idx="18"/>
-          </p:nvPr>
-        </p:nvSpPr>
-        <p:spPr/>
-      </p:sp>
-      <p:sp>
-        <p:nvSpPr>
           <p:cNvPr id="7" name="Text Placeholder 6"/>
           <p:cNvSpPr>
             <a:spLocks noGrp="1"/>
@@ -17589,8 +17596,8 @@
         </p:nvSpPr>
         <p:spPr>
           <a:xfrm>
-            <a:off x="15181169" y="8035439"/>
-            <a:ext cx="13592864" cy="861752"/>
+            <a:off x="15181169" y="6295353"/>
+            <a:ext cx="13592864" cy="15924337"/>
           </a:xfrm>
         </p:spPr>
         <p:txBody>
@@ -17598,285 +17605,161 @@
           <a:lstStyle/>
           <a:p>
             <a:r>
-              <a:rPr lang="en-US" sz="2800" dirty="0">
-                <a:latin typeface="Courier New" pitchFamily="49" charset="0"/>
-                <a:cs typeface="Courier New" pitchFamily="49" charset="0"/>
-              </a:rPr>
+              <a:rPr lang="en-US" sz="3200" dirty="0"/>
               <a:t>let par a = ...</a:t>
             </a:r>
             <a:br>
-              <a:rPr lang="en-US" sz="2800" dirty="0">
-                <a:latin typeface="Courier New" pitchFamily="49" charset="0"/>
-                <a:cs typeface="Courier New" pitchFamily="49" charset="0"/>
-              </a:rPr>
+              <a:rPr lang="en-US" sz="3200" dirty="0"/>
             </a:br>
             <a:r>
-              <a:rPr lang="en-US" sz="2800" dirty="0">
-                <a:latin typeface="Courier New" pitchFamily="49" charset="0"/>
-                <a:cs typeface="Courier New" pitchFamily="49" charset="0"/>
-              </a:rPr>
+              <a:rPr lang="en-US" sz="3200" dirty="0"/>
               <a:t>            let par x = ...</a:t>
             </a:r>
             <a:br>
-              <a:rPr lang="en-US" sz="2800" dirty="0">
-                <a:latin typeface="Courier New" pitchFamily="49" charset="0"/>
-                <a:cs typeface="Courier New" pitchFamily="49" charset="0"/>
-              </a:rPr>
+              <a:rPr lang="en-US" sz="3200" dirty="0"/>
             </a:br>
             <a:r>
-              <a:rPr lang="en-US" sz="2800" dirty="0">
-                <a:latin typeface="Courier New" pitchFamily="49" charset="0"/>
-                <a:cs typeface="Courier New" pitchFamily="49" charset="0"/>
-              </a:rPr>
+              <a:rPr lang="en-US" sz="3200" dirty="0"/>
               <a:t>                    y = ...</a:t>
             </a:r>
             <a:br>
-              <a:rPr lang="en-US" sz="2800" dirty="0">
-                <a:latin typeface="Courier New" pitchFamily="49" charset="0"/>
-                <a:cs typeface="Courier New" pitchFamily="49" charset="0"/>
-              </a:rPr>
+              <a:rPr lang="en-US" sz="3200" dirty="0"/>
             </a:br>
             <a:r>
-              <a:rPr lang="en-US" sz="2800" dirty="0">
-                <a:latin typeface="Courier New" pitchFamily="49" charset="0"/>
-                <a:cs typeface="Courier New" pitchFamily="49" charset="0"/>
-              </a:rPr>
+              <a:rPr lang="en-US" sz="3200" dirty="0"/>
               <a:t>             in ...</a:t>
             </a:r>
             <a:br>
-              <a:rPr lang="en-US" sz="2800" dirty="0">
-                <a:latin typeface="Courier New" pitchFamily="49" charset="0"/>
-                <a:cs typeface="Courier New" pitchFamily="49" charset="0"/>
-              </a:rPr>
+              <a:rPr lang="en-US" sz="3200" dirty="0"/>
             </a:br>
             <a:r>
-              <a:rPr lang="en-US" sz="2800" dirty="0">
-                <a:latin typeface="Courier New" pitchFamily="49" charset="0"/>
-                <a:cs typeface="Courier New" pitchFamily="49" charset="0"/>
-              </a:rPr>
+              <a:rPr lang="en-US" sz="3200" dirty="0"/>
               <a:t>        b = ...</a:t>
             </a:r>
             <a:br>
-              <a:rPr lang="en-US" sz="2800" dirty="0">
-                <a:latin typeface="Courier New" pitchFamily="49" charset="0"/>
-                <a:cs typeface="Courier New" pitchFamily="49" charset="0"/>
-              </a:rPr>
+              <a:rPr lang="en-US" sz="3200" dirty="0"/>
             </a:br>
             <a:r>
-              <a:rPr lang="en-US" sz="2800" dirty="0">
-                <a:latin typeface="Courier New" pitchFamily="49" charset="0"/>
-                <a:cs typeface="Courier New" pitchFamily="49" charset="0"/>
-              </a:rPr>
+              <a:rPr lang="en-US" sz="3200" dirty="0"/>
               <a:t> in </a:t>
             </a:r>
             <a:r>
-              <a:rPr lang="en-US" sz="2800" dirty="0" smtClean="0">
-                <a:latin typeface="Courier New" pitchFamily="49" charset="0"/>
-                <a:cs typeface="Courier New" pitchFamily="49" charset="0"/>
-              </a:rPr>
+              <a:rPr lang="en-US" sz="3200" dirty="0" smtClean="0"/>
               <a:t>...</a:t>
             </a:r>
           </a:p>
           <a:p>
-            <a:endParaRPr lang="en-US" sz="2800" dirty="0">
-              <a:latin typeface="Courier New" pitchFamily="49" charset="0"/>
-              <a:cs typeface="Courier New" pitchFamily="49" charset="0"/>
-            </a:endParaRPr>
-          </a:p>
-          <a:p>
-            <a:endParaRPr lang="en-US" sz="2800" dirty="0" smtClean="0">
-              <a:latin typeface="Courier New" pitchFamily="49" charset="0"/>
-              <a:cs typeface="Courier New" pitchFamily="49" charset="0"/>
-            </a:endParaRPr>
-          </a:p>
-          <a:p>
-            <a:endParaRPr lang="en-US" sz="2800" dirty="0">
-              <a:latin typeface="Courier New" pitchFamily="49" charset="0"/>
-              <a:cs typeface="Courier New" pitchFamily="49" charset="0"/>
-            </a:endParaRPr>
-          </a:p>
-          <a:p>
-            <a:endParaRPr lang="en-US" sz="2800" dirty="0" smtClean="0">
-              <a:latin typeface="Courier New" pitchFamily="49" charset="0"/>
-              <a:cs typeface="Courier New" pitchFamily="49" charset="0"/>
-            </a:endParaRPr>
-          </a:p>
-          <a:p>
-            <a:endParaRPr lang="en-US" sz="2800" dirty="0">
-              <a:latin typeface="Courier New" pitchFamily="49" charset="0"/>
-              <a:cs typeface="Courier New" pitchFamily="49" charset="0"/>
-            </a:endParaRPr>
-          </a:p>
-          <a:p>
-            <a:endParaRPr lang="en-US" sz="2800" dirty="0" smtClean="0">
-              <a:latin typeface="Courier New" pitchFamily="49" charset="0"/>
-              <a:cs typeface="Courier New" pitchFamily="49" charset="0"/>
-            </a:endParaRPr>
-          </a:p>
-          <a:p>
-            <a:endParaRPr lang="en-US" sz="2800" dirty="0">
-              <a:latin typeface="Courier New" pitchFamily="49" charset="0"/>
-              <a:cs typeface="Courier New" pitchFamily="49" charset="0"/>
-            </a:endParaRPr>
-          </a:p>
-          <a:p>
-            <a:endParaRPr lang="en-US" sz="2800" dirty="0" smtClean="0">
-              <a:latin typeface="Courier New" pitchFamily="49" charset="0"/>
-              <a:cs typeface="Courier New" pitchFamily="49" charset="0"/>
-            </a:endParaRPr>
-          </a:p>
-          <a:p>
-            <a:endParaRPr lang="en-US" sz="2800" dirty="0">
-              <a:latin typeface="Courier New" pitchFamily="49" charset="0"/>
-              <a:cs typeface="Courier New" pitchFamily="49" charset="0"/>
-            </a:endParaRPr>
-          </a:p>
-          <a:p>
-            <a:endParaRPr lang="en-US" sz="2800" dirty="0" smtClean="0">
-              <a:latin typeface="Courier New" pitchFamily="49" charset="0"/>
-              <a:cs typeface="Courier New" pitchFamily="49" charset="0"/>
-            </a:endParaRPr>
-          </a:p>
-          <a:p>
-            <a:endParaRPr lang="en-US" sz="2800" dirty="0">
-              <a:latin typeface="Courier New" pitchFamily="49" charset="0"/>
-              <a:cs typeface="Courier New" pitchFamily="49" charset="0"/>
-            </a:endParaRPr>
-          </a:p>
-          <a:p>
-            <a:endParaRPr lang="en-US" sz="2800" dirty="0" smtClean="0">
-              <a:latin typeface="Courier New" pitchFamily="49" charset="0"/>
-              <a:cs typeface="Courier New" pitchFamily="49" charset="0"/>
-            </a:endParaRPr>
-          </a:p>
-          <a:p>
-            <a:endParaRPr lang="en-US" sz="2800" dirty="0">
-              <a:latin typeface="Courier New" pitchFamily="49" charset="0"/>
-              <a:cs typeface="Courier New" pitchFamily="49" charset="0"/>
-            </a:endParaRPr>
-          </a:p>
-          <a:p>
-            <a:endParaRPr lang="en-US" sz="2800" dirty="0" smtClean="0">
-              <a:latin typeface="Courier New" pitchFamily="49" charset="0"/>
-              <a:cs typeface="Courier New" pitchFamily="49" charset="0"/>
-            </a:endParaRPr>
-          </a:p>
-          <a:p>
-            <a:r>
-              <a:rPr lang="en-US" sz="2800" dirty="0">
-                <a:latin typeface="Courier New" pitchFamily="49" charset="0"/>
-                <a:cs typeface="Courier New" pitchFamily="49" charset="0"/>
-              </a:rPr>
+            <a:endParaRPr lang="en-US" sz="3200" dirty="0"/>
+          </a:p>
+          <a:p>
+            <a:endParaRPr lang="en-US" sz="3200" dirty="0" smtClean="0"/>
+          </a:p>
+          <a:p>
+            <a:endParaRPr lang="en-US" sz="3200" dirty="0"/>
+          </a:p>
+          <a:p>
+            <a:endParaRPr lang="en-US" sz="3200" dirty="0" smtClean="0"/>
+          </a:p>
+          <a:p>
+            <a:endParaRPr lang="en-US" sz="3200" dirty="0"/>
+          </a:p>
+          <a:p>
+            <a:endParaRPr lang="en-US" sz="3200" dirty="0" smtClean="0"/>
+          </a:p>
+          <a:p>
+            <a:endParaRPr lang="en-US" sz="3200" dirty="0"/>
+          </a:p>
+          <a:p>
+            <a:endParaRPr lang="en-US" sz="3200" dirty="0" smtClean="0"/>
+          </a:p>
+          <a:p>
+            <a:endParaRPr lang="en-US" sz="3200" dirty="0"/>
+          </a:p>
+          <a:p>
+            <a:endParaRPr lang="en-US" sz="3200" dirty="0" smtClean="0"/>
+          </a:p>
+          <a:p>
+            <a:endParaRPr lang="en-US" sz="3200" dirty="0"/>
+          </a:p>
+          <a:p>
+            <a:endParaRPr lang="en-US" sz="3200" dirty="0" smtClean="0"/>
+          </a:p>
+          <a:p>
+            <a:endParaRPr lang="en-US" sz="3200" dirty="0"/>
+          </a:p>
+          <a:p>
+            <a:endParaRPr lang="en-US" sz="3200" dirty="0" smtClean="0"/>
+          </a:p>
+          <a:p>
+            <a:r>
+              <a:rPr lang="en-US" sz="3200" dirty="0"/>
               <a:t>let par a = ...</a:t>
             </a:r>
             <a:br>
-              <a:rPr lang="en-US" sz="2800" dirty="0">
-                <a:latin typeface="Courier New" pitchFamily="49" charset="0"/>
-                <a:cs typeface="Courier New" pitchFamily="49" charset="0"/>
-              </a:rPr>
+              <a:rPr lang="en-US" sz="3200" dirty="0"/>
             </a:br>
             <a:r>
-              <a:rPr lang="en-US" sz="2800" dirty="0">
-                <a:latin typeface="Courier New" pitchFamily="49" charset="0"/>
-                <a:cs typeface="Courier New" pitchFamily="49" charset="0"/>
-              </a:rPr>
+              <a:rPr lang="en-US" sz="3200" dirty="0"/>
               <a:t>            let par x = ... </a:t>
             </a:r>
             <a:r>
-              <a:rPr lang="en-US" sz="2800" b="1" dirty="0">
+              <a:rPr lang="en-US" sz="3200" b="1" dirty="0">
                 <a:solidFill>
                   <a:srgbClr val="FF0000"/>
                 </a:solidFill>
-                <a:latin typeface="Courier New" pitchFamily="49" charset="0"/>
-                <a:cs typeface="Courier New" pitchFamily="49" charset="0"/>
               </a:rPr>
               <a:t>Put(l)</a:t>
             </a:r>
             <a:r>
-              <a:rPr lang="en-US" sz="2800" dirty="0">
-                <a:latin typeface="Courier New" pitchFamily="49" charset="0"/>
-                <a:cs typeface="Courier New" pitchFamily="49" charset="0"/>
-              </a:rPr>
+              <a:rPr lang="en-US" sz="3200" dirty="0"/>
               <a:t> ...</a:t>
             </a:r>
             <a:br>
-              <a:rPr lang="en-US" sz="2800" dirty="0">
-                <a:latin typeface="Courier New" pitchFamily="49" charset="0"/>
-                <a:cs typeface="Courier New" pitchFamily="49" charset="0"/>
-              </a:rPr>
+              <a:rPr lang="en-US" sz="3200" dirty="0"/>
             </a:br>
             <a:r>
-              <a:rPr lang="en-US" sz="2800" dirty="0">
-                <a:latin typeface="Courier New" pitchFamily="49" charset="0"/>
-                <a:cs typeface="Courier New" pitchFamily="49" charset="0"/>
-              </a:rPr>
+              <a:rPr lang="en-US" sz="3200" dirty="0"/>
               <a:t>                    y = ...</a:t>
             </a:r>
             <a:br>
-              <a:rPr lang="en-US" sz="2800" dirty="0">
-                <a:latin typeface="Courier New" pitchFamily="49" charset="0"/>
-                <a:cs typeface="Courier New" pitchFamily="49" charset="0"/>
-              </a:rPr>
+              <a:rPr lang="en-US" sz="3200" dirty="0"/>
             </a:br>
             <a:r>
-              <a:rPr lang="en-US" sz="2800" dirty="0">
-                <a:latin typeface="Courier New" pitchFamily="49" charset="0"/>
-                <a:cs typeface="Courier New" pitchFamily="49" charset="0"/>
-              </a:rPr>
+              <a:rPr lang="en-US" sz="3200" dirty="0"/>
               <a:t>             in ...</a:t>
             </a:r>
             <a:br>
-              <a:rPr lang="en-US" sz="2800" dirty="0">
-                <a:latin typeface="Courier New" pitchFamily="49" charset="0"/>
-                <a:cs typeface="Courier New" pitchFamily="49" charset="0"/>
-              </a:rPr>
+              <a:rPr lang="en-US" sz="3200" dirty="0"/>
             </a:br>
             <a:r>
-              <a:rPr lang="en-US" sz="2800" dirty="0">
-                <a:latin typeface="Courier New" pitchFamily="49" charset="0"/>
-                <a:cs typeface="Courier New" pitchFamily="49" charset="0"/>
-              </a:rPr>
+              <a:rPr lang="en-US" sz="3200" dirty="0"/>
               <a:t>        b = ... </a:t>
             </a:r>
             <a:r>
-              <a:rPr lang="en-US" sz="2800" b="1" dirty="0">
+              <a:rPr lang="en-US" sz="3200" b="1" dirty="0">
                 <a:solidFill>
                   <a:srgbClr val="FF0000"/>
                 </a:solidFill>
-                <a:latin typeface="Courier New" pitchFamily="49" charset="0"/>
-                <a:cs typeface="Courier New" pitchFamily="49" charset="0"/>
               </a:rPr>
               <a:t>Get(l)</a:t>
             </a:r>
             <a:r>
-              <a:rPr lang="en-US" sz="2800" dirty="0">
-                <a:latin typeface="Courier New" pitchFamily="49" charset="0"/>
-                <a:cs typeface="Courier New" pitchFamily="49" charset="0"/>
-              </a:rPr>
+              <a:rPr lang="en-US" sz="3200" dirty="0"/>
               <a:t> ...</a:t>
             </a:r>
             <a:br>
-              <a:rPr lang="en-US" sz="2800" dirty="0">
-                <a:latin typeface="Courier New" pitchFamily="49" charset="0"/>
-                <a:cs typeface="Courier New" pitchFamily="49" charset="0"/>
-              </a:rPr>
+              <a:rPr lang="en-US" sz="3200" dirty="0"/>
             </a:br>
             <a:r>
-              <a:rPr lang="en-US" sz="2800" dirty="0">
-                <a:latin typeface="Courier New" pitchFamily="49" charset="0"/>
-                <a:cs typeface="Courier New" pitchFamily="49" charset="0"/>
-              </a:rPr>
+              <a:rPr lang="en-US" sz="3200" dirty="0"/>
               <a:t> in ...</a:t>
             </a:r>
           </a:p>
           <a:p>
-            <a:endParaRPr lang="en-US" sz="2800" dirty="0">
-              <a:latin typeface="Courier New" pitchFamily="49" charset="0"/>
-              <a:cs typeface="Courier New" pitchFamily="49" charset="0"/>
-            </a:endParaRPr>
-          </a:p>
-          <a:p>
-            <a:endParaRPr lang="en-US" dirty="0"/>
+            <a:endParaRPr lang="en-US" sz="3200" dirty="0"/>
+          </a:p>
+          <a:p>
+            <a:endParaRPr lang="en-US" sz="3200" dirty="0"/>
           </a:p>
         </p:txBody>
       </p:sp>
@@ -17892,8 +17775,8 @@
         </p:nvSpPr>
         <p:spPr>
           <a:xfrm>
-            <a:off x="28725810" y="20152726"/>
-            <a:ext cx="13573125" cy="754045"/>
+            <a:off x="15200908" y="23194330"/>
+            <a:ext cx="13573125" cy="6106279"/>
           </a:xfrm>
         </p:spPr>
         <p:txBody>
@@ -17960,8 +17843,14 @@
               <a:t> </a:t>
             </a:r>
             <a:r>
-              <a:rPr lang="en-US" dirty="0" err="1" smtClean="0"/>
-              <a:t>rakkit</a:t>
+              <a:rPr lang="en-US" dirty="0" smtClean="0"/>
+              <a:t>racket</a:t>
+            </a:r>
+          </a:p>
+          <a:p>
+            <a:r>
+              <a:rPr lang="en-US" dirty="0" smtClean="0"/>
+              <a:t>Future of Project</a:t>
             </a:r>
             <a:endParaRPr lang="en-US" dirty="0"/>
           </a:p>
@@ -17979,8 +17868,8 @@
         </p:nvSpPr>
         <p:spPr>
           <a:xfrm>
-            <a:off x="1197734" y="11984743"/>
-            <a:ext cx="13571534" cy="861752"/>
+            <a:off x="29405269" y="6186040"/>
+            <a:ext cx="13571534" cy="3613275"/>
           </a:xfrm>
         </p:spPr>
         <p:txBody>
@@ -17988,134 +17877,232 @@
           <a:lstStyle/>
           <a:p>
             <a:pPr algn="just"/>
+            <a:r>
+              <a:rPr lang="en-US" sz="3200" dirty="0" smtClean="0"/>
+              <a:t>Before </a:t>
+            </a:r>
+            <a:r>
+              <a:rPr lang="en-US" sz="3200" dirty="0" smtClean="0"/>
+              <a:t>I began working on this project, there was already an implementation of the </a:t>
+            </a:r>
+            <a:r>
+              <a:rPr lang="en-US" sz="3200" dirty="0" smtClean="0"/>
+              <a:t>counte</a:t>
+            </a:r>
+            <a:r>
+              <a:rPr lang="en-US" sz="3200" dirty="0" smtClean="0"/>
+              <a:t>r </a:t>
+            </a:r>
+            <a:r>
+              <a:rPr lang="en-US" sz="3200" dirty="0" err="1" smtClean="0"/>
+              <a:t>lvar</a:t>
+            </a:r>
+            <a:r>
+              <a:rPr lang="en-US" sz="3200" dirty="0" smtClean="0"/>
+              <a:t>, c, that allows the user to put a value in and if you attempted to get a value, it will return true as long as that value doesn’t exceed the max value, the value that was put into the </a:t>
+            </a:r>
+            <a:r>
+              <a:rPr lang="en-US" sz="3200" dirty="0" err="1" smtClean="0"/>
+              <a:t>lvar</a:t>
+            </a:r>
+            <a:r>
+              <a:rPr lang="en-US" sz="3200" dirty="0" smtClean="0"/>
+              <a:t>.</a:t>
+            </a:r>
+          </a:p>
+          <a:p>
+            <a:pPr algn="just"/>
+            <a:endParaRPr lang="en-US" sz="3200" dirty="0"/>
+          </a:p>
+          <a:p>
+            <a:pPr algn="just"/>
+            <a:r>
+              <a:rPr lang="en-US" sz="3200" dirty="0" err="1" smtClean="0"/>
+              <a:t>Lvar</a:t>
+            </a:r>
+            <a:r>
+              <a:rPr lang="en-US" sz="3200" dirty="0" smtClean="0"/>
+              <a:t> B allows for pairs of values. </a:t>
+            </a:r>
+            <a:endParaRPr lang="en-US" sz="3200" dirty="0"/>
+          </a:p>
+        </p:txBody>
+      </p:sp>
+      <p:sp>
+        <p:nvSpPr>
+          <p:cNvPr id="387" name="Text Placeholder 386"/>
+          <p:cNvSpPr>
+            <a:spLocks noGrp="1"/>
+          </p:cNvSpPr>
+          <p:nvPr>
+            <p:ph type="body" sz="quarter" idx="24"/>
+          </p:nvPr>
+        </p:nvSpPr>
+        <p:spPr>
+          <a:solidFill>
+            <a:schemeClr val="tx2">
+              <a:lumMod val="60000"/>
+              <a:lumOff val="40000"/>
+            </a:schemeClr>
+          </a:solidFill>
+        </p:spPr>
+        <p:txBody>
+          <a:bodyPr>
+            <a:noAutofit/>
+          </a:bodyPr>
+          <a:lstStyle/>
+          <a:p>
+            <a:r>
+              <a:rPr lang="en-US" sz="4800" dirty="0" smtClean="0"/>
+              <a:t>The Problem</a:t>
+            </a:r>
+            <a:endParaRPr lang="en-US" sz="4800" dirty="0"/>
+          </a:p>
+        </p:txBody>
+      </p:sp>
+      <p:sp>
+        <p:nvSpPr>
+          <p:cNvPr id="554" name="Text Placeholder 553"/>
+          <p:cNvSpPr>
+            <a:spLocks noGrp="1"/>
+          </p:cNvSpPr>
+          <p:nvPr>
+            <p:ph type="body" sz="quarter" idx="25"/>
+          </p:nvPr>
+        </p:nvSpPr>
+        <p:spPr>
+          <a:solidFill>
+            <a:schemeClr val="tx2">
+              <a:lumMod val="60000"/>
+              <a:lumOff val="40000"/>
+            </a:schemeClr>
+          </a:solidFill>
+        </p:spPr>
+        <p:txBody>
+          <a:bodyPr/>
+          <a:lstStyle/>
+          <a:p>
+            <a:endParaRPr lang="en-US"/>
+          </a:p>
+        </p:txBody>
+      </p:sp>
+      <p:sp>
+        <p:nvSpPr>
+          <p:cNvPr id="559" name="Text Placeholder 558"/>
+          <p:cNvSpPr>
+            <a:spLocks noGrp="1"/>
+          </p:cNvSpPr>
+          <p:nvPr>
+            <p:ph type="body" sz="quarter" idx="30"/>
+          </p:nvPr>
+        </p:nvSpPr>
+        <p:spPr>
+          <a:xfrm>
+            <a:off x="29395742" y="29863621"/>
+            <a:ext cx="13581061" cy="2505279"/>
+          </a:xfrm>
+        </p:spPr>
+        <p:txBody>
+          <a:bodyPr/>
+          <a:lstStyle/>
+          <a:p>
+            <a:pPr algn="ctr"/>
+            <a:r>
+              <a:rPr lang="en-US" sz="3200" dirty="0" smtClean="0"/>
+              <a:t>Isaiah Weating --- iweating@indiana.edu</a:t>
+            </a:r>
+          </a:p>
+          <a:p>
+            <a:pPr algn="ctr"/>
+            <a:r>
+              <a:rPr lang="en-US" sz="3200" dirty="0" smtClean="0"/>
+              <a:t>Lindsey </a:t>
+            </a:r>
+            <a:r>
+              <a:rPr lang="en-US" sz="3200" dirty="0" err="1" smtClean="0"/>
+              <a:t>Kuper</a:t>
+            </a:r>
+            <a:r>
+              <a:rPr lang="en-US" sz="3200" dirty="0" smtClean="0"/>
+              <a:t> – </a:t>
+            </a:r>
+            <a:r>
+              <a:rPr lang="en-US" sz="3200" dirty="0" smtClean="0"/>
+              <a:t>lkuper@cs.indiana.edu</a:t>
+            </a:r>
+          </a:p>
+          <a:p>
             <a:endParaRPr lang="en-US" dirty="0" smtClean="0"/>
           </a:p>
           <a:p>
-            <a:pPr algn="just"/>
             <a:endParaRPr lang="en-US" dirty="0"/>
           </a:p>
-          <a:p>
-            <a:pPr algn="just"/>
-            <a:endParaRPr lang="en-US" dirty="0" smtClean="0"/>
-          </a:p>
-          <a:p>
-            <a:pPr algn="just"/>
+        </p:txBody>
+      </p:sp>
+      <p:sp>
+        <p:nvSpPr>
+          <p:cNvPr id="409" name="Text Placeholder 408"/>
+          <p:cNvSpPr>
+            <a:spLocks noGrp="1"/>
+          </p:cNvSpPr>
+          <p:nvPr>
+            <p:ph type="body" sz="quarter" idx="150"/>
+          </p:nvPr>
+        </p:nvSpPr>
+        <p:spPr>
+          <a:xfrm>
+            <a:off x="5064459" y="3498247"/>
+            <a:ext cx="32867102" cy="1280160"/>
+          </a:xfrm>
+        </p:spPr>
+        <p:txBody>
+          <a:bodyPr/>
+          <a:lstStyle/>
+          <a:p>
+            <a:r>
+              <a:rPr lang="en-US" dirty="0" smtClean="0"/>
+              <a:t> School of Informatics and Computing - Indiana </a:t>
+            </a:r>
+            <a:r>
+              <a:rPr lang="en-US" dirty="0" smtClean="0"/>
+              <a:t>University</a:t>
+            </a:r>
             <a:endParaRPr lang="en-US" dirty="0"/>
           </a:p>
-          <a:p>
-            <a:pPr algn="just"/>
-            <a:endParaRPr lang="en-US" dirty="0" smtClean="0"/>
-          </a:p>
-          <a:p>
-            <a:pPr algn="just"/>
-            <a:endParaRPr lang="en-US" dirty="0"/>
-          </a:p>
-          <a:p>
-            <a:pPr algn="just"/>
-            <a:endParaRPr lang="en-US" dirty="0" smtClean="0"/>
-          </a:p>
-          <a:p>
-            <a:pPr algn="just"/>
-            <a:endParaRPr lang="en-US" dirty="0"/>
-          </a:p>
-          <a:p>
-            <a:pPr algn="just"/>
-            <a:endParaRPr lang="en-US" dirty="0" smtClean="0"/>
-          </a:p>
-          <a:p>
-            <a:pPr algn="just"/>
-            <a:endParaRPr lang="en-US" dirty="0"/>
-          </a:p>
-          <a:p>
-            <a:pPr algn="just"/>
-            <a:endParaRPr lang="en-US" dirty="0" smtClean="0"/>
-          </a:p>
-          <a:p>
-            <a:pPr algn="just"/>
-            <a:endParaRPr lang="en-US" dirty="0"/>
-          </a:p>
-          <a:p>
-            <a:pPr algn="just"/>
-            <a:endParaRPr lang="en-US" dirty="0" smtClean="0"/>
-          </a:p>
-          <a:p>
-            <a:pPr algn="just"/>
-            <a:r>
-              <a:rPr lang="en-US" dirty="0" smtClean="0"/>
-              <a:t>Before I began working on this project, there was already an implementation of the linear </a:t>
-            </a:r>
-            <a:r>
-              <a:rPr lang="en-US" dirty="0" err="1" smtClean="0"/>
-              <a:t>lvar</a:t>
-            </a:r>
-            <a:r>
-              <a:rPr lang="en-US" dirty="0" smtClean="0"/>
-              <a:t>, c, that allows the user to put a value in and if you attempted to get a value, it will return true as long as that value doesn’t exceed the max value, the value that was put into the </a:t>
-            </a:r>
-            <a:r>
-              <a:rPr lang="en-US" dirty="0" err="1" smtClean="0"/>
-              <a:t>lvar</a:t>
-            </a:r>
-            <a:r>
-              <a:rPr lang="en-US" dirty="0" smtClean="0"/>
-              <a:t>.</a:t>
-            </a:r>
-          </a:p>
-          <a:p>
-            <a:pPr algn="just"/>
-            <a:endParaRPr lang="en-US" dirty="0"/>
-          </a:p>
-          <a:p>
-            <a:pPr algn="just"/>
-            <a:r>
-              <a:rPr lang="en-US" dirty="0" err="1" smtClean="0"/>
-              <a:t>Lvar</a:t>
-            </a:r>
-            <a:r>
-              <a:rPr lang="en-US" dirty="0" smtClean="0"/>
-              <a:t> B allows for pairs of values. </a:t>
-            </a:r>
-            <a:endParaRPr lang="en-US" dirty="0"/>
-          </a:p>
-        </p:txBody>
-      </p:sp>
-      <p:sp>
-        <p:nvSpPr>
-          <p:cNvPr id="386" name="Text Placeholder 385"/>
-          <p:cNvSpPr>
-            <a:spLocks noGrp="1"/>
-          </p:cNvSpPr>
-          <p:nvPr>
-            <p:ph type="body" sz="quarter" idx="23"/>
-          </p:nvPr>
-        </p:nvSpPr>
-        <p:spPr/>
+        </p:txBody>
+      </p:sp>
+      <p:sp>
+        <p:nvSpPr>
+          <p:cNvPr id="410" name="Text Placeholder 409"/>
+          <p:cNvSpPr>
+            <a:spLocks noGrp="1"/>
+          </p:cNvSpPr>
+          <p:nvPr>
+            <p:ph type="body" sz="quarter" idx="151"/>
+          </p:nvPr>
+        </p:nvSpPr>
+        <p:spPr>
+          <a:xfrm>
+            <a:off x="5064459" y="2076633"/>
+            <a:ext cx="32867102" cy="1514794"/>
+          </a:xfrm>
+        </p:spPr>
         <p:txBody>
           <a:bodyPr>
             <a:normAutofit/>
           </a:bodyPr>
           <a:lstStyle/>
           <a:p>
+            <a:r>
+              <a:rPr lang="en-US" dirty="0"/>
+              <a:t>Isaiah Weating &amp; Lindsey </a:t>
+            </a:r>
+            <a:r>
+              <a:rPr lang="en-US" dirty="0" err="1"/>
+              <a:t>Kuper</a:t>
+            </a:r>
             <a:endParaRPr lang="en-US" dirty="0"/>
           </a:p>
-        </p:txBody>
-      </p:sp>
-      <p:sp>
-        <p:nvSpPr>
-          <p:cNvPr id="387" name="Text Placeholder 386"/>
-          <p:cNvSpPr>
-            <a:spLocks noGrp="1"/>
-          </p:cNvSpPr>
-          <p:nvPr>
-            <p:ph type="body" sz="quarter" idx="24"/>
-          </p:nvPr>
-        </p:nvSpPr>
-        <p:spPr/>
-        <p:txBody>
-          <a:bodyPr>
-            <a:normAutofit/>
-          </a:bodyPr>
-          <a:lstStyle/>
           <a:p>
             <a:endParaRPr lang="en-US" dirty="0"/>
           </a:p>
@@ -18123,195 +18110,20 @@
       </p:sp>
       <p:sp>
         <p:nvSpPr>
-          <p:cNvPr id="554" name="Text Placeholder 553"/>
-          <p:cNvSpPr>
-            <a:spLocks noGrp="1"/>
-          </p:cNvSpPr>
-          <p:nvPr>
-            <p:ph type="body" sz="quarter" idx="25"/>
-          </p:nvPr>
-        </p:nvSpPr>
-        <p:spPr/>
-        <p:txBody>
-          <a:bodyPr/>
-          <a:lstStyle/>
-          <a:p>
-            <a:endParaRPr lang="en-US"/>
-          </a:p>
-        </p:txBody>
-      </p:sp>
-      <p:sp>
-        <p:nvSpPr>
-          <p:cNvPr id="555" name="Text Placeholder 554"/>
-          <p:cNvSpPr>
-            <a:spLocks noGrp="1"/>
-          </p:cNvSpPr>
-          <p:nvPr>
-            <p:ph type="body" sz="quarter" idx="26"/>
-          </p:nvPr>
-        </p:nvSpPr>
-        <p:spPr/>
-        <p:txBody>
-          <a:bodyPr/>
-          <a:lstStyle/>
-          <a:p>
-            <a:endParaRPr lang="en-US"/>
-          </a:p>
-        </p:txBody>
-      </p:sp>
-      <p:sp>
-        <p:nvSpPr>
-          <p:cNvPr id="556" name="Text Placeholder 555"/>
-          <p:cNvSpPr>
-            <a:spLocks noGrp="1"/>
-          </p:cNvSpPr>
-          <p:nvPr>
-            <p:ph type="body" sz="quarter" idx="27"/>
-          </p:nvPr>
-        </p:nvSpPr>
-        <p:spPr/>
-        <p:txBody>
-          <a:bodyPr/>
-          <a:lstStyle/>
-          <a:p>
-            <a:endParaRPr lang="en-US"/>
-          </a:p>
-        </p:txBody>
-      </p:sp>
-      <p:sp>
-        <p:nvSpPr>
-          <p:cNvPr id="557" name="Text Placeholder 556"/>
-          <p:cNvSpPr>
-            <a:spLocks noGrp="1"/>
-          </p:cNvSpPr>
-          <p:nvPr>
-            <p:ph type="body" sz="quarter" idx="28"/>
-          </p:nvPr>
-        </p:nvSpPr>
-        <p:spPr/>
-        <p:txBody>
-          <a:bodyPr/>
-          <a:lstStyle/>
-          <a:p>
-            <a:endParaRPr lang="en-US"/>
-          </a:p>
-        </p:txBody>
-      </p:sp>
-      <p:sp>
-        <p:nvSpPr>
-          <p:cNvPr id="558" name="Text Placeholder 557"/>
-          <p:cNvSpPr>
-            <a:spLocks noGrp="1"/>
-          </p:cNvSpPr>
-          <p:nvPr>
-            <p:ph type="body" sz="quarter" idx="29"/>
-          </p:nvPr>
-        </p:nvSpPr>
-        <p:spPr/>
-        <p:txBody>
-          <a:bodyPr/>
-          <a:lstStyle/>
-          <a:p>
-            <a:endParaRPr lang="en-US"/>
-          </a:p>
-        </p:txBody>
-      </p:sp>
-      <p:sp>
-        <p:nvSpPr>
-          <p:cNvPr id="559" name="Text Placeholder 558"/>
-          <p:cNvSpPr>
-            <a:spLocks noGrp="1"/>
-          </p:cNvSpPr>
-          <p:nvPr>
-            <p:ph type="body" sz="quarter" idx="30"/>
-          </p:nvPr>
-        </p:nvSpPr>
-        <p:spPr>
-          <a:xfrm>
-            <a:off x="29395742" y="26625887"/>
-            <a:ext cx="13581061" cy="1822015"/>
-          </a:xfrm>
-        </p:spPr>
-        <p:txBody>
-          <a:bodyPr/>
-          <a:lstStyle/>
-          <a:p>
-            <a:r>
-              <a:rPr lang="en-US" dirty="0" smtClean="0"/>
-              <a:t>Isaiah Weating --- </a:t>
-            </a:r>
-            <a:r>
-              <a:rPr lang="en-US" dirty="0" smtClean="0">
-                <a:hlinkClick r:id="rId3"/>
-              </a:rPr>
-              <a:t>iweating@indiana.edu</a:t>
-            </a:r>
-            <a:endParaRPr lang="en-US" dirty="0" smtClean="0"/>
-          </a:p>
-          <a:p>
-            <a:r>
-              <a:rPr lang="en-US" dirty="0" smtClean="0"/>
-              <a:t>Lindsey </a:t>
-            </a:r>
-            <a:r>
-              <a:rPr lang="en-US" dirty="0" err="1" smtClean="0"/>
-              <a:t>Kuper</a:t>
-            </a:r>
-            <a:r>
-              <a:rPr lang="en-US" dirty="0" smtClean="0"/>
-              <a:t> </a:t>
-            </a:r>
-            <a:r>
-              <a:rPr lang="en-US" smtClean="0"/>
-              <a:t>– </a:t>
-            </a:r>
-            <a:r>
-              <a:rPr lang="en-US" smtClean="0">
-                <a:hlinkClick r:id="rId4"/>
-              </a:rPr>
-              <a:t>lkuper@cs.indiana.edu</a:t>
-            </a:r>
-            <a:endParaRPr lang="en-US" smtClean="0"/>
-          </a:p>
-          <a:p>
-            <a:endParaRPr lang="en-US" dirty="0"/>
-          </a:p>
-        </p:txBody>
-      </p:sp>
-      <p:sp>
-        <p:nvSpPr>
-          <p:cNvPr id="409" name="Text Placeholder 408"/>
-          <p:cNvSpPr>
-            <a:spLocks noGrp="1"/>
-          </p:cNvSpPr>
-          <p:nvPr>
-            <p:ph type="body" sz="quarter" idx="150"/>
-          </p:nvPr>
-        </p:nvSpPr>
-        <p:spPr/>
-        <p:txBody>
-          <a:bodyPr/>
-          <a:lstStyle/>
-          <a:p>
-            <a:r>
-              <a:rPr lang="en-US" dirty="0" smtClean="0"/>
-              <a:t>Indiana University</a:t>
-            </a:r>
-            <a:endParaRPr lang="en-US" dirty="0"/>
-          </a:p>
-        </p:txBody>
-      </p:sp>
-      <p:sp>
-        <p:nvSpPr>
-          <p:cNvPr id="410" name="Text Placeholder 409"/>
-          <p:cNvSpPr>
-            <a:spLocks noGrp="1"/>
-          </p:cNvSpPr>
-          <p:nvPr>
-            <p:ph type="body" sz="quarter" idx="151"/>
-          </p:nvPr>
-        </p:nvSpPr>
-        <p:spPr/>
+          <p:cNvPr id="411" name="Text Placeholder 410"/>
+          <p:cNvSpPr>
+            <a:spLocks noGrp="1"/>
+          </p:cNvSpPr>
+          <p:nvPr>
+            <p:ph type="body" sz="quarter" idx="153"/>
+          </p:nvPr>
+        </p:nvSpPr>
+        <p:spPr>
+          <a:xfrm>
+            <a:off x="5064459" y="632979"/>
+            <a:ext cx="32867102" cy="1637973"/>
+          </a:xfrm>
+        </p:spPr>
         <p:txBody>
           <a:bodyPr>
             <a:normAutofit fontScale="92500" lnSpcReduction="10000"/>
@@ -18319,44 +18131,20 @@
           <a:lstStyle/>
           <a:p>
             <a:r>
-              <a:rPr lang="en-US" dirty="0"/>
-              <a:t>Isaiah Weating &amp; Lindsey </a:t>
-            </a:r>
-            <a:r>
-              <a:rPr lang="en-US" dirty="0" err="1"/>
-              <a:t>Kuper</a:t>
-            </a:r>
-            <a:endParaRPr lang="en-US" dirty="0"/>
-          </a:p>
-          <a:p>
-            <a:endParaRPr lang="en-US" dirty="0"/>
-          </a:p>
-        </p:txBody>
-      </p:sp>
-      <p:sp>
-        <p:nvSpPr>
-          <p:cNvPr id="411" name="Text Placeholder 410"/>
-          <p:cNvSpPr>
-            <a:spLocks noGrp="1"/>
-          </p:cNvSpPr>
-          <p:nvPr>
-            <p:ph type="body" sz="quarter" idx="153"/>
-          </p:nvPr>
-        </p:nvSpPr>
-        <p:spPr/>
-        <p:txBody>
-          <a:bodyPr>
-            <a:normAutofit fontScale="92500" lnSpcReduction="10000"/>
-          </a:bodyPr>
-          <a:lstStyle/>
-          <a:p>
-            <a:r>
               <a:rPr lang="en-US" dirty="0" err="1"/>
               <a:t>LVars</a:t>
             </a:r>
             <a:r>
               <a:rPr lang="en-US" dirty="0"/>
-              <a:t> For Parallel Programming</a:t>
+              <a:t> </a:t>
+            </a:r>
+            <a:r>
+              <a:rPr lang="en-US" dirty="0" smtClean="0"/>
+              <a:t>for </a:t>
+            </a:r>
+            <a:r>
+              <a:rPr lang="en-US" dirty="0"/>
+              <a:t>Parallel Programming</a:t>
             </a:r>
           </a:p>
           <a:p>
@@ -18999,7 +18787,7 @@
           <p:nvPr/>
         </p:nvPicPr>
         <p:blipFill>
-          <a:blip r:embed="rId5">
+          <a:blip r:embed="rId3">
             <a:clrChange>
               <a:clrFrom>
                 <a:srgbClr val="FFFFFF"/>
@@ -19023,8 +18811,8 @@
         </p:blipFill>
         <p:spPr bwMode="auto">
           <a:xfrm>
-            <a:off x="16894762" y="10666555"/>
-            <a:ext cx="10165679" cy="7780565"/>
+            <a:off x="15980368" y="8693389"/>
+            <a:ext cx="12173525" cy="9317322"/>
           </a:xfrm>
           <a:prstGeom prst="rect">
             <a:avLst/>
@@ -19063,7 +18851,7 @@
           <p:nvPr/>
         </p:nvPicPr>
         <p:blipFill>
-          <a:blip r:embed="rId6">
+          <a:blip r:embed="rId4">
             <a:clrChange>
               <a:clrFrom>
                 <a:srgbClr val="FFFFFF"/>
@@ -19077,7 +18865,7 @@
             <a:extLst>
               <a:ext uri="{BEBA8EAE-BF5A-486C-A8C5-ECC9F3942E4B}">
                 <a14:imgProps xmlns:a14="http://schemas.microsoft.com/office/drawing/2010/main">
-                  <a14:imgLayer r:embed="rId7">
+                  <a14:imgLayer r:embed="rId5">
                     <a14:imgEffect>
                       <a14:brightnessContrast bright="20000"/>
                     </a14:imgEffect>
@@ -19096,8 +18884,8 @@
         </p:blipFill>
         <p:spPr bwMode="auto">
           <a:xfrm>
-            <a:off x="31277448" y="10444078"/>
-            <a:ext cx="9484226" cy="4805804"/>
+            <a:off x="29851778" y="13641315"/>
+            <a:ext cx="12684356" cy="6427359"/>
           </a:xfrm>
           <a:prstGeom prst="rect">
             <a:avLst/>
@@ -19137,12 +18925,555 @@
             <p:ph type="body" sz="quarter" idx="22"/>
           </p:nvPr>
         </p:nvSpPr>
-        <p:spPr/>
+        <p:spPr>
+          <a:xfrm>
+            <a:off x="922338" y="20506585"/>
+            <a:ext cx="13563595" cy="800211"/>
+          </a:xfrm>
+        </p:spPr>
         <p:txBody>
           <a:bodyPr/>
           <a:lstStyle/>
           <a:p>
-            <a:endParaRPr lang="en-US"/>
+            <a:r>
+              <a:rPr lang="en-US" sz="4000" dirty="0">
+                <a:latin typeface="Times New Roman" pitchFamily="18" charset="0"/>
+                <a:cs typeface="Times New Roman" pitchFamily="18" charset="0"/>
+              </a:rPr>
+              <a:t>Determinism for </a:t>
+            </a:r>
+            <a:r>
+              <a:rPr lang="el-GR" sz="4000" dirty="0" smtClean="0">
+                <a:latin typeface="Times New Roman" pitchFamily="18" charset="0"/>
+                <a:cs typeface="Times New Roman" pitchFamily="18" charset="0"/>
+              </a:rPr>
+              <a:t>λ</a:t>
+            </a:r>
+            <a:r>
+              <a:rPr lang="en-US" sz="4000" dirty="0" smtClean="0">
+                <a:latin typeface="Times New Roman" pitchFamily="18" charset="0"/>
+                <a:cs typeface="Times New Roman" pitchFamily="18" charset="0"/>
+              </a:rPr>
+              <a:t> </a:t>
+            </a:r>
+            <a:r>
+              <a:rPr lang="en-US" sz="4000" dirty="0" err="1" smtClean="0">
+                <a:latin typeface="Times New Roman" pitchFamily="18" charset="0"/>
+                <a:cs typeface="Times New Roman" pitchFamily="18" charset="0"/>
+              </a:rPr>
+              <a:t>LVar</a:t>
+            </a:r>
+            <a:endParaRPr lang="en-US" sz="4000" dirty="0">
+              <a:latin typeface="Times New Roman" pitchFamily="18" charset="0"/>
+              <a:cs typeface="Times New Roman" pitchFamily="18" charset="0"/>
+            </a:endParaRPr>
+          </a:p>
+        </p:txBody>
+      </p:sp>
+      <p:pic>
+        <p:nvPicPr>
+          <p:cNvPr id="1030" name="Picture 6" descr="http://womenshealthresearch.us/wp-content/uploads/2013/02/iu_logo.jpg"/>
+          <p:cNvPicPr>
+            <a:picLocks noChangeAspect="1" noChangeArrowheads="1"/>
+          </p:cNvPicPr>
+          <p:nvPr/>
+        </p:nvPicPr>
+        <p:blipFill>
+          <a:blip r:embed="rId6" cstate="print">
+            <a:clrChange>
+              <a:clrFrom>
+                <a:srgbClr val="FFFFFF"/>
+              </a:clrFrom>
+              <a:clrTo>
+                <a:srgbClr val="FFFFFF">
+                  <a:alpha val="0"/>
+                </a:srgbClr>
+              </a:clrTo>
+            </a:clrChange>
+            <a:extLst>
+              <a:ext uri="{28A0092B-C50C-407E-A947-70E740481C1C}">
+                <a14:useLocalDpi xmlns:a14="http://schemas.microsoft.com/office/drawing/2010/main" val="0"/>
+              </a:ext>
+            </a:extLst>
+          </a:blip>
+          <a:srcRect/>
+          <a:stretch>
+            <a:fillRect/>
+          </a:stretch>
+        </p:blipFill>
+        <p:spPr bwMode="auto">
+          <a:xfrm>
+            <a:off x="2833083" y="836177"/>
+            <a:ext cx="2231376" cy="2869550"/>
+          </a:xfrm>
+          <a:prstGeom prst="rect">
+            <a:avLst/>
+          </a:prstGeom>
+          <a:noFill/>
+          <a:extLst>
+            <a:ext uri="{909E8E84-426E-40DD-AFC4-6F175D3DCCD1}">
+              <a14:hiddenFill xmlns:a14="http://schemas.microsoft.com/office/drawing/2010/main">
+                <a:solidFill>
+                  <a:srgbClr val="FFFFFF"/>
+                </a:solidFill>
+              </a14:hiddenFill>
+            </a:ext>
+          </a:extLst>
+        </p:spPr>
+      </p:pic>
+      <p:pic>
+        <p:nvPicPr>
+          <p:cNvPr id="63" name="Picture 6" descr="http://womenshealthresearch.us/wp-content/uploads/2013/02/iu_logo.jpg"/>
+          <p:cNvPicPr>
+            <a:picLocks noChangeAspect="1" noChangeArrowheads="1"/>
+          </p:cNvPicPr>
+          <p:nvPr/>
+        </p:nvPicPr>
+        <p:blipFill>
+          <a:blip r:embed="rId6" cstate="print">
+            <a:clrChange>
+              <a:clrFrom>
+                <a:srgbClr val="FFFFFF"/>
+              </a:clrFrom>
+              <a:clrTo>
+                <a:srgbClr val="FFFFFF">
+                  <a:alpha val="0"/>
+                </a:srgbClr>
+              </a:clrTo>
+            </a:clrChange>
+            <a:extLst>
+              <a:ext uri="{28A0092B-C50C-407E-A947-70E740481C1C}">
+                <a14:useLocalDpi xmlns:a14="http://schemas.microsoft.com/office/drawing/2010/main" val="0"/>
+              </a:ext>
+            </a:extLst>
+          </a:blip>
+          <a:srcRect/>
+          <a:stretch>
+            <a:fillRect/>
+          </a:stretch>
+        </p:blipFill>
+        <p:spPr bwMode="auto">
+          <a:xfrm>
+            <a:off x="37931561" y="836177"/>
+            <a:ext cx="2231376" cy="2869550"/>
+          </a:xfrm>
+          <a:prstGeom prst="rect">
+            <a:avLst/>
+          </a:prstGeom>
+          <a:noFill/>
+          <a:extLst>
+            <a:ext uri="{909E8E84-426E-40DD-AFC4-6F175D3DCCD1}">
+              <a14:hiddenFill xmlns:a14="http://schemas.microsoft.com/office/drawing/2010/main">
+                <a:solidFill>
+                  <a:srgbClr val="FFFFFF"/>
+                </a:solidFill>
+              </a14:hiddenFill>
+            </a:ext>
+          </a:extLst>
+        </p:spPr>
+      </p:pic>
+      <p:pic>
+        <p:nvPicPr>
+          <p:cNvPr id="1031" name="Picture 7"/>
+          <p:cNvPicPr>
+            <a:picLocks noChangeAspect="1" noChangeArrowheads="1"/>
+          </p:cNvPicPr>
+          <p:nvPr/>
+        </p:nvPicPr>
+        <p:blipFill>
+          <a:blip r:embed="rId7">
+            <a:extLst>
+              <a:ext uri="{28A0092B-C50C-407E-A947-70E740481C1C}">
+                <a14:useLocalDpi xmlns:a14="http://schemas.microsoft.com/office/drawing/2010/main" val="0"/>
+              </a:ext>
+            </a:extLst>
+          </a:blip>
+          <a:srcRect/>
+          <a:stretch>
+            <a:fillRect/>
+          </a:stretch>
+        </p:blipFill>
+        <p:spPr bwMode="auto">
+          <a:xfrm>
+            <a:off x="922338" y="32182676"/>
+            <a:ext cx="4486275" cy="609600"/>
+          </a:xfrm>
+          <a:prstGeom prst="rect">
+            <a:avLst/>
+          </a:prstGeom>
+          <a:noFill/>
+          <a:ln>
+            <a:noFill/>
+          </a:ln>
+          <a:extLst>
+            <a:ext uri="{909E8E84-426E-40DD-AFC4-6F175D3DCCD1}">
+              <a14:hiddenFill xmlns:a14="http://schemas.microsoft.com/office/drawing/2010/main">
+                <a:solidFill>
+                  <a:schemeClr val="accent1"/>
+                </a:solidFill>
+              </a14:hiddenFill>
+            </a:ext>
+            <a:ext uri="{91240B29-F687-4F45-9708-019B960494DF}">
+              <a14:hiddenLine xmlns:a14="http://schemas.microsoft.com/office/drawing/2010/main" w="9525">
+                <a:solidFill>
+                  <a:schemeClr val="tx1"/>
+                </a:solidFill>
+                <a:miter lim="800000"/>
+                <a:headEnd/>
+                <a:tailEnd/>
+              </a14:hiddenLine>
+            </a:ext>
+          </a:extLst>
+        </p:spPr>
+      </p:pic>
+      <p:pic>
+        <p:nvPicPr>
+          <p:cNvPr id="1032" name="Picture 8"/>
+          <p:cNvPicPr>
+            <a:picLocks noChangeAspect="1" noChangeArrowheads="1"/>
+          </p:cNvPicPr>
+          <p:nvPr/>
+        </p:nvPicPr>
+        <p:blipFill rotWithShape="1">
+          <a:blip r:embed="rId8">
+            <a:clrChange>
+              <a:clrFrom>
+                <a:srgbClr val="FFFAF1"/>
+              </a:clrFrom>
+              <a:clrTo>
+                <a:srgbClr val="FFFAF1">
+                  <a:alpha val="0"/>
+                </a:srgbClr>
+              </a:clrTo>
+            </a:clrChange>
+            <a:extLst>
+              <a:ext uri="{28A0092B-C50C-407E-A947-70E740481C1C}">
+                <a14:useLocalDpi xmlns:a14="http://schemas.microsoft.com/office/drawing/2010/main" val="0"/>
+              </a:ext>
+            </a:extLst>
+          </a:blip>
+          <a:srcRect l="1" t="41681" r="-2036" b="38893"/>
+          <a:stretch/>
+        </p:blipFill>
+        <p:spPr bwMode="auto">
+          <a:xfrm>
+            <a:off x="941293" y="25207834"/>
+            <a:ext cx="17157842" cy="2550285"/>
+          </a:xfrm>
+          <a:prstGeom prst="rect">
+            <a:avLst/>
+          </a:prstGeom>
+          <a:noFill/>
+          <a:ln>
+            <a:noFill/>
+          </a:ln>
+          <a:extLst>
+            <a:ext uri="{909E8E84-426E-40DD-AFC4-6F175D3DCCD1}">
+              <a14:hiddenFill xmlns:a14="http://schemas.microsoft.com/office/drawing/2010/main">
+                <a:solidFill>
+                  <a:schemeClr val="accent1"/>
+                </a:solidFill>
+              </a14:hiddenFill>
+            </a:ext>
+            <a:ext uri="{91240B29-F687-4F45-9708-019B960494DF}">
+              <a14:hiddenLine xmlns:a14="http://schemas.microsoft.com/office/drawing/2010/main" w="9525">
+                <a:solidFill>
+                  <a:schemeClr val="tx1"/>
+                </a:solidFill>
+                <a:miter lim="800000"/>
+                <a:headEnd/>
+                <a:tailEnd/>
+              </a14:hiddenLine>
+            </a:ext>
+          </a:extLst>
+        </p:spPr>
+      </p:pic>
+      <p:pic>
+        <p:nvPicPr>
+          <p:cNvPr id="69" name="Picture 8"/>
+          <p:cNvPicPr>
+            <a:picLocks noChangeAspect="1" noChangeArrowheads="1"/>
+          </p:cNvPicPr>
+          <p:nvPr/>
+        </p:nvPicPr>
+        <p:blipFill rotWithShape="1">
+          <a:blip r:embed="rId8">
+            <a:clrChange>
+              <a:clrFrom>
+                <a:srgbClr val="FFFFFF"/>
+              </a:clrFrom>
+              <a:clrTo>
+                <a:srgbClr val="FFFFFF">
+                  <a:alpha val="0"/>
+                </a:srgbClr>
+              </a:clrTo>
+            </a:clrChange>
+            <a:extLst>
+              <a:ext uri="{28A0092B-C50C-407E-A947-70E740481C1C}">
+                <a14:useLocalDpi xmlns:a14="http://schemas.microsoft.com/office/drawing/2010/main" val="0"/>
+              </a:ext>
+            </a:extLst>
+          </a:blip>
+          <a:srcRect l="5717" t="3826" r="37187" b="60489"/>
+          <a:stretch/>
+        </p:blipFill>
+        <p:spPr bwMode="auto">
+          <a:xfrm>
+            <a:off x="941293" y="21499512"/>
+            <a:ext cx="7678831" cy="3746760"/>
+          </a:xfrm>
+          <a:prstGeom prst="rect">
+            <a:avLst/>
+          </a:prstGeom>
+          <a:noFill/>
+          <a:ln>
+            <a:noFill/>
+          </a:ln>
+          <a:extLst>
+            <a:ext uri="{909E8E84-426E-40DD-AFC4-6F175D3DCCD1}">
+              <a14:hiddenFill xmlns:a14="http://schemas.microsoft.com/office/drawing/2010/main">
+                <a:solidFill>
+                  <a:schemeClr val="accent1"/>
+                </a:solidFill>
+              </a14:hiddenFill>
+            </a:ext>
+            <a:ext uri="{91240B29-F687-4F45-9708-019B960494DF}">
+              <a14:hiddenLine xmlns:a14="http://schemas.microsoft.com/office/drawing/2010/main" w="9525">
+                <a:solidFill>
+                  <a:schemeClr val="tx1"/>
+                </a:solidFill>
+                <a:miter lim="800000"/>
+                <a:headEnd/>
+                <a:tailEnd/>
+              </a14:hiddenLine>
+            </a:ext>
+          </a:extLst>
+        </p:spPr>
+      </p:pic>
+      <p:pic>
+        <p:nvPicPr>
+          <p:cNvPr id="70" name="Picture 8"/>
+          <p:cNvPicPr>
+            <a:picLocks noChangeAspect="1" noChangeArrowheads="1"/>
+          </p:cNvPicPr>
+          <p:nvPr/>
+        </p:nvPicPr>
+        <p:blipFill rotWithShape="1">
+          <a:blip r:embed="rId8">
+            <a:clrChange>
+              <a:clrFrom>
+                <a:srgbClr val="FFFFFF"/>
+              </a:clrFrom>
+              <a:clrTo>
+                <a:srgbClr val="FFFFFF">
+                  <a:alpha val="0"/>
+                </a:srgbClr>
+              </a:clrTo>
+            </a:clrChange>
+            <a:extLst>
+              <a:ext uri="{28A0092B-C50C-407E-A947-70E740481C1C}">
+                <a14:useLocalDpi xmlns:a14="http://schemas.microsoft.com/office/drawing/2010/main" val="0"/>
+              </a:ext>
+            </a:extLst>
+          </a:blip>
+          <a:srcRect l="42001" t="62520" r="3901" b="2199"/>
+          <a:stretch/>
+        </p:blipFill>
+        <p:spPr bwMode="auto">
+          <a:xfrm>
+            <a:off x="5719270" y="26692972"/>
+            <a:ext cx="7275715" cy="3704360"/>
+          </a:xfrm>
+          <a:prstGeom prst="rect">
+            <a:avLst/>
+          </a:prstGeom>
+          <a:noFill/>
+          <a:ln>
+            <a:noFill/>
+          </a:ln>
+          <a:extLst>
+            <a:ext uri="{909E8E84-426E-40DD-AFC4-6F175D3DCCD1}">
+              <a14:hiddenFill xmlns:a14="http://schemas.microsoft.com/office/drawing/2010/main">
+                <a:solidFill>
+                  <a:schemeClr val="accent1"/>
+                </a:solidFill>
+              </a14:hiddenFill>
+            </a:ext>
+            <a:ext uri="{91240B29-F687-4F45-9708-019B960494DF}">
+              <a14:hiddenLine xmlns:a14="http://schemas.microsoft.com/office/drawing/2010/main" w="9525">
+                <a:solidFill>
+                  <a:schemeClr val="tx1"/>
+                </a:solidFill>
+                <a:miter lim="800000"/>
+                <a:headEnd/>
+                <a:tailEnd/>
+              </a14:hiddenLine>
+            </a:ext>
+          </a:extLst>
+        </p:spPr>
+      </p:pic>
+      <p:sp>
+        <p:nvSpPr>
+          <p:cNvPr id="71" name="Text Placeholder 2"/>
+          <p:cNvSpPr>
+            <a:spLocks noGrp="1"/>
+          </p:cNvSpPr>
+          <p:nvPr>
+            <p:ph type="body" sz="quarter" idx="11"/>
+          </p:nvPr>
+        </p:nvSpPr>
+        <p:spPr>
+          <a:xfrm>
+            <a:off x="29407393" y="20932834"/>
+            <a:ext cx="13573126" cy="923322"/>
+          </a:xfrm>
+          <a:solidFill>
+            <a:schemeClr val="tx2">
+              <a:lumMod val="60000"/>
+              <a:lumOff val="40000"/>
+            </a:schemeClr>
+          </a:solidFill>
+        </p:spPr>
+        <p:txBody>
+          <a:bodyPr/>
+          <a:lstStyle/>
+          <a:p>
+            <a:r>
+              <a:rPr lang="en-US" sz="4800" dirty="0" smtClean="0"/>
+              <a:t>Future Work</a:t>
+            </a:r>
+            <a:endParaRPr lang="en-US" sz="4800" dirty="0"/>
+          </a:p>
+        </p:txBody>
+      </p:sp>
+      <p:sp>
+        <p:nvSpPr>
+          <p:cNvPr id="73" name="Text Placeholder 385"/>
+          <p:cNvSpPr>
+            <a:spLocks noGrp="1"/>
+          </p:cNvSpPr>
+          <p:nvPr>
+            <p:ph type="body" sz="quarter" idx="23"/>
+          </p:nvPr>
+        </p:nvSpPr>
+        <p:spPr>
+          <a:xfrm>
+            <a:off x="29395741" y="21882777"/>
+            <a:ext cx="13571537" cy="860425"/>
+          </a:xfrm>
+        </p:spPr>
+        <p:txBody>
+          <a:bodyPr>
+            <a:noAutofit/>
+          </a:bodyPr>
+          <a:lstStyle/>
+          <a:p>
+            <a:r>
+              <a:rPr lang="en-US" sz="3200" dirty="0" smtClean="0"/>
+              <a:t>Info written by Lindsey</a:t>
+            </a:r>
+            <a:endParaRPr lang="en-US" sz="3200" dirty="0"/>
+          </a:p>
+        </p:txBody>
+      </p:sp>
+      <p:sp>
+        <p:nvSpPr>
+          <p:cNvPr id="74" name="Text Placeholder 2"/>
+          <p:cNvSpPr>
+            <a:spLocks noGrp="1"/>
+          </p:cNvSpPr>
+          <p:nvPr>
+            <p:ph type="body" sz="quarter" idx="11"/>
+          </p:nvPr>
+        </p:nvSpPr>
+        <p:spPr>
+          <a:xfrm>
+            <a:off x="29407393" y="28838948"/>
+            <a:ext cx="13573126" cy="923322"/>
+          </a:xfrm>
+          <a:solidFill>
+            <a:schemeClr val="tx2">
+              <a:lumMod val="60000"/>
+              <a:lumOff val="40000"/>
+            </a:schemeClr>
+          </a:solidFill>
+        </p:spPr>
+        <p:txBody>
+          <a:bodyPr/>
+          <a:lstStyle/>
+          <a:p>
+            <a:r>
+              <a:rPr lang="en-US" sz="4800" dirty="0" smtClean="0"/>
+              <a:t>Contacts</a:t>
+            </a:r>
+            <a:endParaRPr lang="en-US" sz="4800" dirty="0"/>
+          </a:p>
+        </p:txBody>
+      </p:sp>
+      <p:sp>
+        <p:nvSpPr>
+          <p:cNvPr id="76" name="Text Placeholder 2"/>
+          <p:cNvSpPr>
+            <a:spLocks noGrp="1"/>
+          </p:cNvSpPr>
+          <p:nvPr>
+            <p:ph type="body" sz="quarter" idx="11"/>
+          </p:nvPr>
+        </p:nvSpPr>
+        <p:spPr>
+          <a:xfrm>
+            <a:off x="941293" y="12126113"/>
+            <a:ext cx="13573126" cy="923322"/>
+          </a:xfrm>
+          <a:solidFill>
+            <a:schemeClr val="tx2">
+              <a:lumMod val="60000"/>
+              <a:lumOff val="40000"/>
+            </a:schemeClr>
+          </a:solidFill>
+        </p:spPr>
+        <p:txBody>
+          <a:bodyPr/>
+          <a:lstStyle/>
+          <a:p>
+            <a:r>
+              <a:rPr lang="en-US" sz="4800" dirty="0" smtClean="0"/>
+              <a:t>Tools Used</a:t>
+            </a:r>
+            <a:endParaRPr lang="en-US" sz="4800" dirty="0"/>
+          </a:p>
+        </p:txBody>
+      </p:sp>
+      <p:sp>
+        <p:nvSpPr>
+          <p:cNvPr id="77" name="Text Placeholder 385"/>
+          <p:cNvSpPr>
+            <a:spLocks noGrp="1"/>
+          </p:cNvSpPr>
+          <p:nvPr>
+            <p:ph type="body" sz="quarter" idx="23"/>
+          </p:nvPr>
+        </p:nvSpPr>
+        <p:spPr>
+          <a:xfrm>
+            <a:off x="904186" y="12986612"/>
+            <a:ext cx="13571537" cy="1570225"/>
+          </a:xfrm>
+        </p:spPr>
+        <p:txBody>
+          <a:bodyPr>
+            <a:noAutofit/>
+          </a:bodyPr>
+          <a:lstStyle/>
+          <a:p>
+            <a:r>
+              <a:rPr lang="en-US" sz="3200" dirty="0" err="1"/>
+              <a:t>Reddex</a:t>
+            </a:r>
+            <a:r>
+              <a:rPr lang="en-US" sz="3200" dirty="0"/>
+              <a:t> is a programming language used for creating programming languages which is embedded in the racket language</a:t>
+            </a:r>
           </a:p>
         </p:txBody>
       </p:sp>

</xml_diff>